<commit_message>
meros 1.2.0 graphical abstract
</commit_message>
<xml_diff>
--- a/src/img/meros-graphical-abstract.pptx
+++ b/src/img/meros-graphical-abstract.pptx
@@ -243,7 +243,7 @@
           <a:p>
             <a:fld id="{758523DB-1EDD-4A73-9803-D008E5CAF974}" type="datetimeFigureOut">
               <a:rPr lang="pl-PL" smtClean="0"/>
-              <a:t>2023-08-01</a:t>
+              <a:t>2024-01-30</a:t>
             </a:fld>
             <a:endParaRPr lang="pl-PL"/>
           </a:p>
@@ -413,7 +413,7 @@
           <a:p>
             <a:fld id="{758523DB-1EDD-4A73-9803-D008E5CAF974}" type="datetimeFigureOut">
               <a:rPr lang="pl-PL" smtClean="0"/>
-              <a:t>2023-08-01</a:t>
+              <a:t>2024-01-30</a:t>
             </a:fld>
             <a:endParaRPr lang="pl-PL"/>
           </a:p>
@@ -593,7 +593,7 @@
           <a:p>
             <a:fld id="{758523DB-1EDD-4A73-9803-D008E5CAF974}" type="datetimeFigureOut">
               <a:rPr lang="pl-PL" smtClean="0"/>
-              <a:t>2023-08-01</a:t>
+              <a:t>2024-01-30</a:t>
             </a:fld>
             <a:endParaRPr lang="pl-PL"/>
           </a:p>
@@ -763,7 +763,7 @@
           <a:p>
             <a:fld id="{758523DB-1EDD-4A73-9803-D008E5CAF974}" type="datetimeFigureOut">
               <a:rPr lang="pl-PL" smtClean="0"/>
-              <a:t>2023-08-01</a:t>
+              <a:t>2024-01-30</a:t>
             </a:fld>
             <a:endParaRPr lang="pl-PL"/>
           </a:p>
@@ -1007,7 +1007,7 @@
           <a:p>
             <a:fld id="{758523DB-1EDD-4A73-9803-D008E5CAF974}" type="datetimeFigureOut">
               <a:rPr lang="pl-PL" smtClean="0"/>
-              <a:t>2023-08-01</a:t>
+              <a:t>2024-01-30</a:t>
             </a:fld>
             <a:endParaRPr lang="pl-PL"/>
           </a:p>
@@ -1239,7 +1239,7 @@
           <a:p>
             <a:fld id="{758523DB-1EDD-4A73-9803-D008E5CAF974}" type="datetimeFigureOut">
               <a:rPr lang="pl-PL" smtClean="0"/>
-              <a:t>2023-08-01</a:t>
+              <a:t>2024-01-30</a:t>
             </a:fld>
             <a:endParaRPr lang="pl-PL"/>
           </a:p>
@@ -1606,7 +1606,7 @@
           <a:p>
             <a:fld id="{758523DB-1EDD-4A73-9803-D008E5CAF974}" type="datetimeFigureOut">
               <a:rPr lang="pl-PL" smtClean="0"/>
-              <a:t>2023-08-01</a:t>
+              <a:t>2024-01-30</a:t>
             </a:fld>
             <a:endParaRPr lang="pl-PL"/>
           </a:p>
@@ -1724,7 +1724,7 @@
           <a:p>
             <a:fld id="{758523DB-1EDD-4A73-9803-D008E5CAF974}" type="datetimeFigureOut">
               <a:rPr lang="pl-PL" smtClean="0"/>
-              <a:t>2023-08-01</a:t>
+              <a:t>2024-01-30</a:t>
             </a:fld>
             <a:endParaRPr lang="pl-PL"/>
           </a:p>
@@ -1819,7 +1819,7 @@
           <a:p>
             <a:fld id="{758523DB-1EDD-4A73-9803-D008E5CAF974}" type="datetimeFigureOut">
               <a:rPr lang="pl-PL" smtClean="0"/>
-              <a:t>2023-08-01</a:t>
+              <a:t>2024-01-30</a:t>
             </a:fld>
             <a:endParaRPr lang="pl-PL"/>
           </a:p>
@@ -2096,7 +2096,7 @@
           <a:p>
             <a:fld id="{758523DB-1EDD-4A73-9803-D008E5CAF974}" type="datetimeFigureOut">
               <a:rPr lang="pl-PL" smtClean="0"/>
-              <a:t>2023-08-01</a:t>
+              <a:t>2024-01-30</a:t>
             </a:fld>
             <a:endParaRPr lang="pl-PL"/>
           </a:p>
@@ -2353,7 +2353,7 @@
           <a:p>
             <a:fld id="{758523DB-1EDD-4A73-9803-D008E5CAF974}" type="datetimeFigureOut">
               <a:rPr lang="pl-PL" smtClean="0"/>
-              <a:t>2023-08-01</a:t>
+              <a:t>2024-01-30</a:t>
             </a:fld>
             <a:endParaRPr lang="pl-PL"/>
           </a:p>
@@ -2566,7 +2566,7 @@
           <a:p>
             <a:fld id="{758523DB-1EDD-4A73-9803-D008E5CAF974}" type="datetimeFigureOut">
               <a:rPr lang="pl-PL" smtClean="0"/>
-              <a:t>2023-08-01</a:t>
+              <a:t>2024-01-30</a:t>
             </a:fld>
             <a:endParaRPr lang="pl-PL"/>
           </a:p>
@@ -3961,8 +3961,12 @@
               <a:t>-</a:t>
             </a:r>
             <a:r>
+              <a:rPr lang="pl-PL" sz="1600" b="1" i="1" dirty="0" err="1"/>
+              <a:t>related</a:t>
+            </a:r>
+            <a:r>
               <a:rPr lang="en-US" sz="1600" b="1" i="1" dirty="0"/>
-              <a:t>based Systems</a:t>
+              <a:t> Systems</a:t>
             </a:r>
             <a:endParaRPr lang="pl-PL" sz="1600" b="1" i="1" dirty="0"/>
           </a:p>

</xml_diff>